<commit_message>
updated code and related files
</commit_message>
<xml_diff>
--- a/AI_Architecture_Diagrams.pptx
+++ b/AI_Architecture_Diagrams.pptx
@@ -3599,12 +3599,31 @@
               </a:defRPr>
             </a:pPr>
             <a:r>
-              <a:t>Observability Layer</a:t>
-            </a:r>
-          </a:p>
-          <a:p>
-            <a:r>
-              <a:t>• Token Tracking • Latency Monitoring • Error Handling</a:t>
+              <a:t>Observability + Governance Layer</a:t>
+            </a:r>
+            <a:br/>
+            <a:r>
+              <a:t>• Token + latency tracking</a:t>
+            </a:r>
+            <a:br/>
+            <a:r>
+              <a:t>• Fail-open error handling</a:t>
+            </a:r>
+            <a:br/>
+            <a:r>
+              <a:t>• Correlation IDs (pm_session_id / pm_run_id)</a:t>
+            </a:r>
+            <a:br/>
+            <a:r>
+              <a:t>• Local JSONL event archive</a:t>
+            </a:r>
+            <a:br/>
+            <a:r>
+              <a:t>• Splunk HEC logging (ai_inference, alerts)</a:t>
+            </a:r>
+            <a:br/>
+            <a:r>
+              <a:t>• Splunk REST summary (Mgmt API 8089)</a:t>
             </a:r>
           </a:p>
         </p:txBody>
@@ -4222,28 +4241,26 @@
             <a:r>
               <a:t>AI Outputs</a:t>
             </a:r>
-          </a:p>
-          <a:p>
-            <a:endParaRPr/>
-          </a:p>
-          <a:p>
-            <a:r>
-              <a:t>• Nurse Actions</a:t>
-            </a:r>
-          </a:p>
-          <a:p>
-            <a:r>
-              <a:t>• Escalation Plan</a:t>
-            </a:r>
-          </a:p>
-          <a:p>
-            <a:r>
-              <a:t>• Token Usage</a:t>
-            </a:r>
-          </a:p>
-          <a:p>
-            <a:r>
-              <a:t>• Latency Stats</a:t>
+            <a:br/>
+            <a:br/>
+            <a:r>
+              <a:t>• Nurse actions + escalation plan</a:t>
+            </a:r>
+            <a:br/>
+            <a:r>
+              <a:t>• Token usage + latency stats</a:t>
+            </a:r>
+            <a:br/>
+            <a:r>
+              <a:t>• Estimated cost per run</a:t>
+            </a:r>
+            <a:br/>
+            <a:r>
+              <a:t>• Events to Splunk (HEC)</a:t>
+            </a:r>
+            <a:br/>
+            <a:r>
+              <a:t>• Run summary (Mgmt API)</a:t>
             </a:r>
           </a:p>
         </p:txBody>
@@ -4933,12 +4950,19 @@
               </a:defRPr>
             </a:pPr>
             <a:r>
-              <a:t>AI Observability Metrics</a:t>
-            </a:r>
-          </a:p>
-          <a:p>
-            <a:r>
-              <a:t>Latency: Response time (seconds) | Tokens: Input + Output + Total | Success Rate: API reliability</a:t>
+              <a:t>AI Observability + Governance</a:t>
+            </a:r>
+            <a:br/>
+            <a:r>
+              <a:t>Latency (ms) | Tokens (in/out/total) | Success/Failure</a:t>
+            </a:r>
+            <a:br/>
+            <a:r>
+              <a:t>Correlation IDs (session/run) | Cost estimate (USD)</a:t>
+            </a:r>
+            <a:br/>
+            <a:r>
+              <a:t>Splunk: HEC events + optional REST run summary</a:t>
             </a:r>
           </a:p>
         </p:txBody>
@@ -5593,22 +5617,31 @@
               </a:defRPr>
             </a:pPr>
             <a:r>
-              <a:t>Monitoring</a:t>
-            </a:r>
-          </a:p>
-          <a:p>
-            <a:r>
-              <a:t>• Token usage viz</a:t>
-            </a:r>
-          </a:p>
-          <a:p>
-            <a:r>
-              <a:t>• Latency tracking</a:t>
-            </a:r>
-          </a:p>
-          <a:p>
-            <a:r>
-              <a:t>• Success metrics</a:t>
+              <a:t>Monitoring / Observability</a:t>
+            </a:r>
+            <a:br/>
+            <a:r>
+              <a:t>• Token usage viz + latency tracking</a:t>
+            </a:r>
+            <a:br/>
+            <a:r>
+              <a:t>• Success metrics + fail-open handling</a:t>
+            </a:r>
+            <a:br/>
+            <a:r>
+              <a:t>• Splunk HEC event ingestion</a:t>
+            </a:r>
+            <a:br/>
+            <a:r>
+              <a:t>• Local JSONL archive</a:t>
+            </a:r>
+            <a:br/>
+            <a:r>
+              <a:t>• Splunk REST run summary (Mgmt API)</a:t>
+            </a:r>
+            <a:br/>
+            <a:r>
+              <a:t>• Cost estimation per token</a:t>
             </a:r>
           </a:p>
         </p:txBody>

</xml_diff>